<commit_message>
update ppt and a new project
</commit_message>
<xml_diff>
--- a/PHP.pptx
+++ b/PHP.pptx
@@ -9807,7 +9807,7 @@
 <dgm:dataModel xmlns:dgm="http://schemas.openxmlformats.org/drawingml/2006/diagram" xmlns:a="http://schemas.openxmlformats.org/drawingml/2006/main">
   <dgm:ptLst>
     <dgm:pt modelId="{E061DAB4-5ADC-4CC0-BAF7-9CF8B3FB45FD}" type="doc">
-      <dgm:prSet loTypeId="urn:microsoft.com/office/officeart/2005/8/layout/vList2" loCatId="list" qsTypeId="urn:microsoft.com/office/officeart/2005/8/quickstyle/simple1" qsCatId="simple" csTypeId="urn:microsoft.com/office/officeart/2005/8/colors/accent1_2" csCatId="accent1"/>
+      <dgm:prSet loTypeId="urn:microsoft.com/office/officeart/2005/8/layout/vList2" loCatId="list" qsTypeId="urn:microsoft.com/office/officeart/2005/8/quickstyle/simple1" qsCatId="simple" csTypeId="urn:microsoft.com/office/officeart/2005/8/colors/accent1_2" csCatId="accent1" phldr="1"/>
       <dgm:spPr/>
       <dgm:t>
         <a:bodyPr/>
@@ -9819,13 +9819,19 @@
     </dgm:pt>
     <dgm:pt modelId="{6C22032A-FCF2-46AC-BAC2-9FE54A02CC69}">
       <dgm:prSet/>
-      <dgm:spPr/>
+      <dgm:spPr>
+        <a:noFill/>
+      </dgm:spPr>
       <dgm:t>
         <a:bodyPr/>
         <a:lstStyle/>
         <a:p>
           <a:r>
-            <a:rPr lang="en-US" dirty="0"/>
+            <a:rPr lang="en-US" dirty="0">
+              <a:solidFill>
+                <a:schemeClr val="tx1"/>
+              </a:solidFill>
+            </a:rPr>
             <a:t>What is a Cookie?</a:t>
           </a:r>
         </a:p>
@@ -9855,13 +9861,19 @@
     </dgm:pt>
     <dgm:pt modelId="{39276586-F765-4F5C-ADCF-5D410A5A96D3}">
       <dgm:prSet/>
-      <dgm:spPr/>
+      <dgm:spPr>
+        <a:noFill/>
+      </dgm:spPr>
       <dgm:t>
         <a:bodyPr/>
         <a:lstStyle/>
         <a:p>
           <a:r>
-            <a:rPr lang="en-US" dirty="0"/>
+            <a:rPr lang="en-US" dirty="0">
+              <a:solidFill>
+                <a:schemeClr val="tx1"/>
+              </a:solidFill>
+            </a:rPr>
             <a:t>A cookie is often used to identify a user. A cookie is a small file that the server embeds on the user's computer. Each time the same computer requests a page with a browser, it will send the cookie too.</a:t>
           </a:r>
         </a:p>
@@ -13030,14 +13042,7 @@
         <a:prstGeom prst="roundRect">
           <a:avLst/>
         </a:prstGeom>
-        <a:solidFill>
-          <a:schemeClr val="accent1">
-            <a:hueOff val="0"/>
-            <a:satOff val="0"/>
-            <a:lumOff val="0"/>
-            <a:alphaOff val="0"/>
-          </a:schemeClr>
-        </a:solidFill>
+        <a:noFill/>
         <a:ln w="19050" cap="flat" cmpd="sng" algn="ctr">
           <a:solidFill>
             <a:schemeClr val="lt1">
@@ -13085,7 +13090,11 @@
             <a:buNone/>
           </a:pPr>
           <a:r>
-            <a:rPr lang="en-US" sz="3000" kern="1200" dirty="0"/>
+            <a:rPr lang="en-US" sz="3000" kern="1200" dirty="0">
+              <a:solidFill>
+                <a:schemeClr val="tx1"/>
+              </a:solidFill>
+            </a:rPr>
             <a:t>What is a Cookie?</a:t>
           </a:r>
         </a:p>
@@ -13108,14 +13117,7 @@
         <a:prstGeom prst="roundRect">
           <a:avLst/>
         </a:prstGeom>
-        <a:solidFill>
-          <a:schemeClr val="accent1">
-            <a:hueOff val="0"/>
-            <a:satOff val="0"/>
-            <a:lumOff val="0"/>
-            <a:alphaOff val="0"/>
-          </a:schemeClr>
-        </a:solidFill>
+        <a:noFill/>
         <a:ln w="19050" cap="flat" cmpd="sng" algn="ctr">
           <a:solidFill>
             <a:schemeClr val="lt1">
@@ -13163,7 +13165,11 @@
             <a:buNone/>
           </a:pPr>
           <a:r>
-            <a:rPr lang="en-US" sz="3000" kern="1200" dirty="0"/>
+            <a:rPr lang="en-US" sz="3000" kern="1200" dirty="0">
+              <a:solidFill>
+                <a:schemeClr val="tx1"/>
+              </a:solidFill>
+            </a:rPr>
             <a:t>A cookie is often used to identify a user. A cookie is a small file that the server embeds on the user's computer. Each time the same computer requests a page with a browser, it will send the cookie too.</a:t>
           </a:r>
         </a:p>
@@ -30471,7 +30477,7 @@
           <a:p>
             <a:fld id="{C9E47760-AFC4-4FEF-80A9-D3C9A603FDD4}" type="datetimeFigureOut">
               <a:rPr lang="en-US" smtClean="0"/>
-              <a:t>17-Jan-26</a:t>
+              <a:t>24-Jan-26</a:t>
             </a:fld>
             <a:endParaRPr lang="en-US"/>
           </a:p>
@@ -30885,7 +30891,7 @@
           <a:p>
             <a:fld id="{28FA24BE-79CB-4FEF-AB40-F46CD62FD034}" type="datetime1">
               <a:rPr lang="en-US" smtClean="0"/>
-              <a:t>17-Jan-26</a:t>
+              <a:t>24-Jan-26</a:t>
             </a:fld>
             <a:endParaRPr lang="en-US"/>
           </a:p>
@@ -31086,7 +31092,7 @@
           <a:p>
             <a:fld id="{807F2D46-FA0C-4127-A7A8-01A33F338711}" type="datetime1">
               <a:rPr lang="en-US" smtClean="0"/>
-              <a:t>17-Jan-26</a:t>
+              <a:t>24-Jan-26</a:t>
             </a:fld>
             <a:endParaRPr lang="en-US"/>
           </a:p>
@@ -31297,7 +31303,7 @@
           <a:p>
             <a:fld id="{598436EB-22EB-45E4-8691-B2B7F7BFBE80}" type="datetime1">
               <a:rPr lang="en-US" smtClean="0"/>
-              <a:t>17-Jan-26</a:t>
+              <a:t>24-Jan-26</a:t>
             </a:fld>
             <a:endParaRPr lang="en-US"/>
           </a:p>
@@ -31498,7 +31504,7 @@
           <a:p>
             <a:fld id="{5F69BD65-CCE2-425E-A688-CEFC8C1CE514}" type="datetime1">
               <a:rPr lang="en-US" smtClean="0"/>
-              <a:t>17-Jan-26</a:t>
+              <a:t>24-Jan-26</a:t>
             </a:fld>
             <a:endParaRPr lang="en-US"/>
           </a:p>
@@ -31789,7 +31795,7 @@
           <a:p>
             <a:fld id="{412D7081-9E39-47D1-B744-964933787DCC}" type="datetime1">
               <a:rPr lang="en-US" smtClean="0"/>
-              <a:t>17-Jan-26</a:t>
+              <a:t>24-Jan-26</a:t>
             </a:fld>
             <a:endParaRPr lang="en-US"/>
           </a:p>
@@ -32057,7 +32063,7 @@
           <a:p>
             <a:fld id="{715B4996-D5FB-4FE4-8507-EF51A9A0AB5D}" type="datetime1">
               <a:rPr lang="en-US" smtClean="0"/>
-              <a:t>17-Jan-26</a:t>
+              <a:t>24-Jan-26</a:t>
             </a:fld>
             <a:endParaRPr lang="en-US"/>
           </a:p>
@@ -32472,7 +32478,7 @@
           <a:p>
             <a:fld id="{58B01BEA-3132-4BB6-ACDC-25909DC58F16}" type="datetime1">
               <a:rPr lang="en-US" smtClean="0"/>
-              <a:t>17-Jan-26</a:t>
+              <a:t>24-Jan-26</a:t>
             </a:fld>
             <a:endParaRPr lang="en-US"/>
           </a:p>
@@ -32616,7 +32622,7 @@
           <a:p>
             <a:fld id="{4D7B9F36-474B-416A-85E1-BE3D78AF42C5}" type="datetime1">
               <a:rPr lang="en-US" smtClean="0"/>
-              <a:t>17-Jan-26</a:t>
+              <a:t>24-Jan-26</a:t>
             </a:fld>
             <a:endParaRPr lang="en-US"/>
           </a:p>
@@ -32732,7 +32738,7 @@
           <a:p>
             <a:fld id="{E7E911BD-0029-4A42-B1E6-B9B1B956E14D}" type="datetime1">
               <a:rPr lang="en-US" smtClean="0"/>
-              <a:t>17-Jan-26</a:t>
+              <a:t>24-Jan-26</a:t>
             </a:fld>
             <a:endParaRPr lang="en-US"/>
           </a:p>
@@ -33046,7 +33052,7 @@
           <a:p>
             <a:fld id="{1770D76B-DB58-4C2D-A64A-0A9148658427}" type="datetime1">
               <a:rPr lang="en-US" smtClean="0"/>
-              <a:t>17-Jan-26</a:t>
+              <a:t>24-Jan-26</a:t>
             </a:fld>
             <a:endParaRPr lang="en-US"/>
           </a:p>
@@ -33337,7 +33343,7 @@
           <a:p>
             <a:fld id="{76B2633F-66A1-40AA-B031-AFF4A993EDEC}" type="datetime1">
               <a:rPr lang="en-US" smtClean="0"/>
-              <a:t>17-Jan-26</a:t>
+              <a:t>24-Jan-26</a:t>
             </a:fld>
             <a:endParaRPr lang="en-US"/>
           </a:p>
@@ -33581,7 +33587,7 @@
           <a:p>
             <a:fld id="{176AEB33-8507-4E16-8322-DE465C5E44A2}" type="datetime1">
               <a:rPr lang="en-US" smtClean="0"/>
-              <a:t>17-Jan-26</a:t>
+              <a:t>24-Jan-26</a:t>
             </a:fld>
             <a:endParaRPr lang="en-US"/>
           </a:p>
@@ -36732,6 +36738,11 @@
           </p:cNvGraphicFramePr>
           <p:nvPr>
             <p:ph idx="1"/>
+            <p:extLst>
+              <p:ext uri="{D42A27DB-BD31-4B8C-83A1-F6EECF244321}">
+                <p14:modId xmlns:p14="http://schemas.microsoft.com/office/powerpoint/2010/main" val="3879287417"/>
+              </p:ext>
+            </p:extLst>
           </p:nvPr>
         </p:nvGraphicFramePr>
         <p:xfrm>
@@ -37879,45 +37890,6 @@
             <a:pPr marL="0" indent="0">
               <a:buNone/>
             </a:pPr>
-            <a:r>
-              <a:rPr lang="en-US" dirty="0"/>
-              <a:t>Session </a:t>
-            </a:r>
-            <a:r>
-              <a:rPr lang="as-IN" b="1" dirty="0"/>
-              <a:t>নিজে নিজে </a:t>
-            </a:r>
-            <a:r>
-              <a:rPr lang="en-US" b="1" dirty="0"/>
-              <a:t>expire </a:t>
-            </a:r>
-            <a:r>
-              <a:rPr lang="as-IN" b="1" dirty="0"/>
-              <a:t>হয় না</a:t>
-            </a:r>
-            <a:br>
-              <a:rPr lang="as-IN" dirty="0"/>
-            </a:br>
-            <a:r>
-              <a:rPr lang="en-US" dirty="0"/>
-              <a:t>Expire </a:t>
-            </a:r>
-            <a:r>
-              <a:rPr lang="as-IN" dirty="0"/>
-              <a:t>হয় </a:t>
-            </a:r>
-            <a:r>
-              <a:rPr lang="as-IN" b="1" dirty="0"/>
-              <a:t>পরের </a:t>
-            </a:r>
-            <a:r>
-              <a:rPr lang="en-US" b="1" dirty="0"/>
-              <a:t>request </a:t>
-            </a:r>
-            <a:r>
-              <a:rPr lang="as-IN" b="1" dirty="0"/>
-              <a:t>এ</a:t>
-            </a:r>
             <a:endParaRPr lang="en-US" dirty="0"/>
           </a:p>
         </p:txBody>

</xml_diff>